<commit_message>
Fix: Restructured some slides and formats
</commit_message>
<xml_diff>
--- a/Festmart Presentation.pptx
+++ b/Festmart Presentation.pptx
@@ -4,6 +4,9 @@
   <p:sldMasterIdLst>
     <p:sldMasterId id="2147483675" r:id="rId1"/>
   </p:sldMasterIdLst>
+  <p:notesMasterIdLst>
+    <p:notesMasterId r:id="rId11"/>
+  </p:notesMasterIdLst>
   <p:sldIdLst>
     <p:sldId id="256" r:id="rId2"/>
     <p:sldId id="257" r:id="rId3"/>
@@ -120,6 +123,439 @@
 </p:presentation>
 </file>
 
+<file path=ppt/notesMasters/notesMaster1.xml><?xml version="1.0" encoding="utf-8"?>
+<p:notesMaster xmlns:a="http://schemas.openxmlformats.org/drawingml/2006/main" xmlns:r="http://schemas.openxmlformats.org/officeDocument/2006/relationships" xmlns:p="http://schemas.openxmlformats.org/presentationml/2006/main">
+  <p:cSld>
+    <p:bg>
+      <p:bgRef idx="1001">
+        <a:schemeClr val="bg1"/>
+      </p:bgRef>
+    </p:bg>
+    <p:spTree>
+      <p:nvGrpSpPr>
+        <p:cNvPr id="1" name=""/>
+        <p:cNvGrpSpPr/>
+        <p:nvPr/>
+      </p:nvGrpSpPr>
+      <p:grpSpPr>
+        <a:xfrm>
+          <a:off x="0" y="0"/>
+          <a:ext cx="0" cy="0"/>
+          <a:chOff x="0" y="0"/>
+          <a:chExt cx="0" cy="0"/>
+        </a:xfrm>
+      </p:grpSpPr>
+      <p:sp>
+        <p:nvSpPr>
+          <p:cNvPr id="2" name="Header Placeholder 1"/>
+          <p:cNvSpPr>
+            <a:spLocks noGrp="1"/>
+          </p:cNvSpPr>
+          <p:nvPr>
+            <p:ph type="hdr" sz="quarter"/>
+          </p:nvPr>
+        </p:nvSpPr>
+        <p:spPr>
+          <a:xfrm>
+            <a:off x="0" y="0"/>
+            <a:ext cx="2971800" cy="458788"/>
+          </a:xfrm>
+          <a:prstGeom prst="rect">
+            <a:avLst/>
+          </a:prstGeom>
+        </p:spPr>
+        <p:txBody>
+          <a:bodyPr vert="horz" lIns="91440" tIns="45720" rIns="91440" bIns="45720" rtlCol="0"/>
+          <a:lstStyle>
+            <a:lvl1pPr algn="l">
+              <a:defRPr sz="1200"/>
+            </a:lvl1pPr>
+          </a:lstStyle>
+          <a:p>
+            <a:endParaRPr lang="en-US"/>
+          </a:p>
+        </p:txBody>
+      </p:sp>
+      <p:sp>
+        <p:nvSpPr>
+          <p:cNvPr id="3" name="Date Placeholder 2"/>
+          <p:cNvSpPr>
+            <a:spLocks noGrp="1"/>
+          </p:cNvSpPr>
+          <p:nvPr>
+            <p:ph type="dt" idx="1"/>
+          </p:nvPr>
+        </p:nvSpPr>
+        <p:spPr>
+          <a:xfrm>
+            <a:off x="3884613" y="0"/>
+            <a:ext cx="2971800" cy="458788"/>
+          </a:xfrm>
+          <a:prstGeom prst="rect">
+            <a:avLst/>
+          </a:prstGeom>
+        </p:spPr>
+        <p:txBody>
+          <a:bodyPr vert="horz" lIns="91440" tIns="45720" rIns="91440" bIns="45720" rtlCol="0"/>
+          <a:lstStyle>
+            <a:lvl1pPr algn="r">
+              <a:defRPr sz="1200"/>
+            </a:lvl1pPr>
+          </a:lstStyle>
+          <a:p>
+            <a:fld id="{90FAAA9E-9967-43A0-A55D-C972B1366060}" type="datetimeFigureOut">
+              <a:rPr lang="en-US" smtClean="0"/>
+              <a:t>15-Aug-24</a:t>
+            </a:fld>
+            <a:endParaRPr lang="en-US"/>
+          </a:p>
+        </p:txBody>
+      </p:sp>
+      <p:sp>
+        <p:nvSpPr>
+          <p:cNvPr id="4" name="Slide Image Placeholder 3"/>
+          <p:cNvSpPr>
+            <a:spLocks noGrp="1" noRot="1" noChangeAspect="1"/>
+          </p:cNvSpPr>
+          <p:nvPr>
+            <p:ph type="sldImg" idx="2"/>
+          </p:nvPr>
+        </p:nvSpPr>
+        <p:spPr>
+          <a:xfrm>
+            <a:off x="685800" y="1143000"/>
+            <a:ext cx="5486400" cy="3086100"/>
+          </a:xfrm>
+          <a:prstGeom prst="rect">
+            <a:avLst/>
+          </a:prstGeom>
+          <a:noFill/>
+          <a:ln w="12700">
+            <a:solidFill>
+              <a:prstClr val="black"/>
+            </a:solidFill>
+          </a:ln>
+        </p:spPr>
+        <p:txBody>
+          <a:bodyPr vert="horz" lIns="91440" tIns="45720" rIns="91440" bIns="45720" rtlCol="0" anchor="ctr"/>
+          <a:lstStyle/>
+          <a:p>
+            <a:endParaRPr lang="en-US"/>
+          </a:p>
+        </p:txBody>
+      </p:sp>
+      <p:sp>
+        <p:nvSpPr>
+          <p:cNvPr id="5" name="Notes Placeholder 4"/>
+          <p:cNvSpPr>
+            <a:spLocks noGrp="1"/>
+          </p:cNvSpPr>
+          <p:nvPr>
+            <p:ph type="body" sz="quarter" idx="3"/>
+          </p:nvPr>
+        </p:nvSpPr>
+        <p:spPr>
+          <a:xfrm>
+            <a:off x="685800" y="4400550"/>
+            <a:ext cx="5486400" cy="3600450"/>
+          </a:xfrm>
+          <a:prstGeom prst="rect">
+            <a:avLst/>
+          </a:prstGeom>
+        </p:spPr>
+        <p:txBody>
+          <a:bodyPr vert="horz" lIns="91440" tIns="45720" rIns="91440" bIns="45720" rtlCol="0"/>
+          <a:lstStyle/>
+          <a:p>
+            <a:pPr lvl="0"/>
+            <a:r>
+              <a:rPr lang="en-US"/>
+              <a:t>Click to edit Master text styles</a:t>
+            </a:r>
+          </a:p>
+          <a:p>
+            <a:pPr lvl="1"/>
+            <a:r>
+              <a:rPr lang="en-US"/>
+              <a:t>Second level</a:t>
+            </a:r>
+          </a:p>
+          <a:p>
+            <a:pPr lvl="2"/>
+            <a:r>
+              <a:rPr lang="en-US"/>
+              <a:t>Third level</a:t>
+            </a:r>
+          </a:p>
+          <a:p>
+            <a:pPr lvl="3"/>
+            <a:r>
+              <a:rPr lang="en-US"/>
+              <a:t>Fourth level</a:t>
+            </a:r>
+          </a:p>
+          <a:p>
+            <a:pPr lvl="4"/>
+            <a:r>
+              <a:rPr lang="en-US"/>
+              <a:t>Fifth level</a:t>
+            </a:r>
+          </a:p>
+        </p:txBody>
+      </p:sp>
+      <p:sp>
+        <p:nvSpPr>
+          <p:cNvPr id="6" name="Footer Placeholder 5"/>
+          <p:cNvSpPr>
+            <a:spLocks noGrp="1"/>
+          </p:cNvSpPr>
+          <p:nvPr>
+            <p:ph type="ftr" sz="quarter" idx="4"/>
+          </p:nvPr>
+        </p:nvSpPr>
+        <p:spPr>
+          <a:xfrm>
+            <a:off x="0" y="8685213"/>
+            <a:ext cx="2971800" cy="458787"/>
+          </a:xfrm>
+          <a:prstGeom prst="rect">
+            <a:avLst/>
+          </a:prstGeom>
+        </p:spPr>
+        <p:txBody>
+          <a:bodyPr vert="horz" lIns="91440" tIns="45720" rIns="91440" bIns="45720" rtlCol="0" anchor="b"/>
+          <a:lstStyle>
+            <a:lvl1pPr algn="l">
+              <a:defRPr sz="1200"/>
+            </a:lvl1pPr>
+          </a:lstStyle>
+          <a:p>
+            <a:endParaRPr lang="en-US"/>
+          </a:p>
+        </p:txBody>
+      </p:sp>
+      <p:sp>
+        <p:nvSpPr>
+          <p:cNvPr id="7" name="Slide Number Placeholder 6"/>
+          <p:cNvSpPr>
+            <a:spLocks noGrp="1"/>
+          </p:cNvSpPr>
+          <p:nvPr>
+            <p:ph type="sldNum" sz="quarter" idx="5"/>
+          </p:nvPr>
+        </p:nvSpPr>
+        <p:spPr>
+          <a:xfrm>
+            <a:off x="3884613" y="8685213"/>
+            <a:ext cx="2971800" cy="458787"/>
+          </a:xfrm>
+          <a:prstGeom prst="rect">
+            <a:avLst/>
+          </a:prstGeom>
+        </p:spPr>
+        <p:txBody>
+          <a:bodyPr vert="horz" lIns="91440" tIns="45720" rIns="91440" bIns="45720" rtlCol="0" anchor="b"/>
+          <a:lstStyle>
+            <a:lvl1pPr algn="r">
+              <a:defRPr sz="1200"/>
+            </a:lvl1pPr>
+          </a:lstStyle>
+          <a:p>
+            <a:fld id="{6EF84B0B-907D-432F-BC3C-B1C0651920EB}" type="slidenum">
+              <a:rPr lang="en-US" smtClean="0"/>
+              <a:t>‹#›</a:t>
+            </a:fld>
+            <a:endParaRPr lang="en-US"/>
+          </a:p>
+        </p:txBody>
+      </p:sp>
+    </p:spTree>
+    <p:extLst>
+      <p:ext uri="{BB962C8B-B14F-4D97-AF65-F5344CB8AC3E}">
+        <p14:creationId xmlns:p14="http://schemas.microsoft.com/office/powerpoint/2010/main" val="1504582686"/>
+      </p:ext>
+    </p:extLst>
+  </p:cSld>
+  <p:clrMap bg1="lt1" tx1="dk1" bg2="lt2" tx2="dk2" accent1="accent1" accent2="accent2" accent3="accent3" accent4="accent4" accent5="accent5" accent6="accent6" hlink="hlink" folHlink="folHlink"/>
+  <p:notesStyle>
+    <a:lvl1pPr marL="0" algn="l" defTabSz="914400" rtl="0" eaLnBrk="1" latinLnBrk="0" hangingPunct="1">
+      <a:defRPr sz="1200" kern="1200">
+        <a:solidFill>
+          <a:schemeClr val="tx1"/>
+        </a:solidFill>
+        <a:latin typeface="+mn-lt"/>
+        <a:ea typeface="+mn-ea"/>
+        <a:cs typeface="+mn-cs"/>
+      </a:defRPr>
+    </a:lvl1pPr>
+    <a:lvl2pPr marL="457200" algn="l" defTabSz="914400" rtl="0" eaLnBrk="1" latinLnBrk="0" hangingPunct="1">
+      <a:defRPr sz="1200" kern="1200">
+        <a:solidFill>
+          <a:schemeClr val="tx1"/>
+        </a:solidFill>
+        <a:latin typeface="+mn-lt"/>
+        <a:ea typeface="+mn-ea"/>
+        <a:cs typeface="+mn-cs"/>
+      </a:defRPr>
+    </a:lvl2pPr>
+    <a:lvl3pPr marL="914400" algn="l" defTabSz="914400" rtl="0" eaLnBrk="1" latinLnBrk="0" hangingPunct="1">
+      <a:defRPr sz="1200" kern="1200">
+        <a:solidFill>
+          <a:schemeClr val="tx1"/>
+        </a:solidFill>
+        <a:latin typeface="+mn-lt"/>
+        <a:ea typeface="+mn-ea"/>
+        <a:cs typeface="+mn-cs"/>
+      </a:defRPr>
+    </a:lvl3pPr>
+    <a:lvl4pPr marL="1371600" algn="l" defTabSz="914400" rtl="0" eaLnBrk="1" latinLnBrk="0" hangingPunct="1">
+      <a:defRPr sz="1200" kern="1200">
+        <a:solidFill>
+          <a:schemeClr val="tx1"/>
+        </a:solidFill>
+        <a:latin typeface="+mn-lt"/>
+        <a:ea typeface="+mn-ea"/>
+        <a:cs typeface="+mn-cs"/>
+      </a:defRPr>
+    </a:lvl4pPr>
+    <a:lvl5pPr marL="1828800" algn="l" defTabSz="914400" rtl="0" eaLnBrk="1" latinLnBrk="0" hangingPunct="1">
+      <a:defRPr sz="1200" kern="1200">
+        <a:solidFill>
+          <a:schemeClr val="tx1"/>
+        </a:solidFill>
+        <a:latin typeface="+mn-lt"/>
+        <a:ea typeface="+mn-ea"/>
+        <a:cs typeface="+mn-cs"/>
+      </a:defRPr>
+    </a:lvl5pPr>
+    <a:lvl6pPr marL="2286000" algn="l" defTabSz="914400" rtl="0" eaLnBrk="1" latinLnBrk="0" hangingPunct="1">
+      <a:defRPr sz="1200" kern="1200">
+        <a:solidFill>
+          <a:schemeClr val="tx1"/>
+        </a:solidFill>
+        <a:latin typeface="+mn-lt"/>
+        <a:ea typeface="+mn-ea"/>
+        <a:cs typeface="+mn-cs"/>
+      </a:defRPr>
+    </a:lvl6pPr>
+    <a:lvl7pPr marL="2743200" algn="l" defTabSz="914400" rtl="0" eaLnBrk="1" latinLnBrk="0" hangingPunct="1">
+      <a:defRPr sz="1200" kern="1200">
+        <a:solidFill>
+          <a:schemeClr val="tx1"/>
+        </a:solidFill>
+        <a:latin typeface="+mn-lt"/>
+        <a:ea typeface="+mn-ea"/>
+        <a:cs typeface="+mn-cs"/>
+      </a:defRPr>
+    </a:lvl7pPr>
+    <a:lvl8pPr marL="3200400" algn="l" defTabSz="914400" rtl="0" eaLnBrk="1" latinLnBrk="0" hangingPunct="1">
+      <a:defRPr sz="1200" kern="1200">
+        <a:solidFill>
+          <a:schemeClr val="tx1"/>
+        </a:solidFill>
+        <a:latin typeface="+mn-lt"/>
+        <a:ea typeface="+mn-ea"/>
+        <a:cs typeface="+mn-cs"/>
+      </a:defRPr>
+    </a:lvl8pPr>
+    <a:lvl9pPr marL="3657600" algn="l" defTabSz="914400" rtl="0" eaLnBrk="1" latinLnBrk="0" hangingPunct="1">
+      <a:defRPr sz="1200" kern="1200">
+        <a:solidFill>
+          <a:schemeClr val="tx1"/>
+        </a:solidFill>
+        <a:latin typeface="+mn-lt"/>
+        <a:ea typeface="+mn-ea"/>
+        <a:cs typeface="+mn-cs"/>
+      </a:defRPr>
+    </a:lvl9pPr>
+  </p:notesStyle>
+</p:notesMaster>
+</file>
+
+<file path=ppt/notesSlides/notesSlide1.xml><?xml version="1.0" encoding="utf-8"?>
+<p:notes xmlns:a="http://schemas.openxmlformats.org/drawingml/2006/main" xmlns:r="http://schemas.openxmlformats.org/officeDocument/2006/relationships" xmlns:p="http://schemas.openxmlformats.org/presentationml/2006/main">
+  <p:cSld>
+    <p:spTree>
+      <p:nvGrpSpPr>
+        <p:cNvPr id="1" name=""/>
+        <p:cNvGrpSpPr/>
+        <p:nvPr/>
+      </p:nvGrpSpPr>
+      <p:grpSpPr>
+        <a:xfrm>
+          <a:off x="0" y="0"/>
+          <a:ext cx="0" cy="0"/>
+          <a:chOff x="0" y="0"/>
+          <a:chExt cx="0" cy="0"/>
+        </a:xfrm>
+      </p:grpSpPr>
+      <p:sp>
+        <p:nvSpPr>
+          <p:cNvPr id="2" name="Slide Image Placeholder 1"/>
+          <p:cNvSpPr>
+            <a:spLocks noGrp="1" noRot="1" noChangeAspect="1"/>
+          </p:cNvSpPr>
+          <p:nvPr>
+            <p:ph type="sldImg"/>
+          </p:nvPr>
+        </p:nvSpPr>
+        <p:spPr/>
+      </p:sp>
+      <p:sp>
+        <p:nvSpPr>
+          <p:cNvPr id="3" name="Notes Placeholder 2"/>
+          <p:cNvSpPr>
+            <a:spLocks noGrp="1"/>
+          </p:cNvSpPr>
+          <p:nvPr>
+            <p:ph type="body" idx="1"/>
+          </p:nvPr>
+        </p:nvSpPr>
+        <p:spPr/>
+        <p:txBody>
+          <a:bodyPr/>
+          <a:lstStyle/>
+          <a:p>
+            <a:endParaRPr lang="en-US" dirty="0"/>
+          </a:p>
+        </p:txBody>
+      </p:sp>
+      <p:sp>
+        <p:nvSpPr>
+          <p:cNvPr id="4" name="Slide Number Placeholder 3"/>
+          <p:cNvSpPr>
+            <a:spLocks noGrp="1"/>
+          </p:cNvSpPr>
+          <p:nvPr>
+            <p:ph type="sldNum" sz="quarter" idx="5"/>
+          </p:nvPr>
+        </p:nvSpPr>
+        <p:spPr/>
+        <p:txBody>
+          <a:bodyPr/>
+          <a:lstStyle/>
+          <a:p>
+            <a:fld id="{6EF84B0B-907D-432F-BC3C-B1C0651920EB}" type="slidenum">
+              <a:rPr lang="en-US" smtClean="0"/>
+              <a:t>4</a:t>
+            </a:fld>
+            <a:endParaRPr lang="en-US"/>
+          </a:p>
+        </p:txBody>
+      </p:sp>
+    </p:spTree>
+    <p:extLst>
+      <p:ext uri="{BB962C8B-B14F-4D97-AF65-F5344CB8AC3E}">
+        <p14:creationId xmlns:p14="http://schemas.microsoft.com/office/powerpoint/2010/main" val="4060319175"/>
+      </p:ext>
+    </p:extLst>
+  </p:cSld>
+  <p:clrMapOvr>
+    <a:masterClrMapping/>
+  </p:clrMapOvr>
+</p:notes>
+</file>
+
 <file path=ppt/slideLayouts/slideLayout1.xml><?xml version="1.0" encoding="utf-8"?>
 <p:sldLayout xmlns:a="http://schemas.openxmlformats.org/drawingml/2006/main" xmlns:r="http://schemas.openxmlformats.org/officeDocument/2006/relationships" xmlns:p="http://schemas.openxmlformats.org/presentationml/2006/main" type="title" preserve="1">
   <p:cSld name="Title Slide">
@@ -407,7 +843,7 @@
           <a:p>
             <a:fld id="{82EF9A90-7641-4094-BE77-53E9358D236A}" type="datetimeFigureOut">
               <a:rPr lang="en-US" smtClean="0"/>
-              <a:t>13-Aug-24</a:t>
+              <a:t>15-Aug-24</a:t>
             </a:fld>
             <a:endParaRPr lang="en-US"/>
           </a:p>
@@ -725,7 +1161,7 @@
           <a:p>
             <a:fld id="{82EF9A90-7641-4094-BE77-53E9358D236A}" type="datetimeFigureOut">
               <a:rPr lang="en-US" smtClean="0"/>
-              <a:t>13-Aug-24</a:t>
+              <a:t>15-Aug-24</a:t>
             </a:fld>
             <a:endParaRPr lang="en-US"/>
           </a:p>
@@ -1213,7 +1649,7 @@
           <a:p>
             <a:fld id="{82EF9A90-7641-4094-BE77-53E9358D236A}" type="datetimeFigureOut">
               <a:rPr lang="en-US" smtClean="0"/>
-              <a:t>13-Aug-24</a:t>
+              <a:t>15-Aug-24</a:t>
             </a:fld>
             <a:endParaRPr lang="en-US"/>
           </a:p>
@@ -1582,7 +2018,7 @@
           <a:p>
             <a:fld id="{82EF9A90-7641-4094-BE77-53E9358D236A}" type="datetimeFigureOut">
               <a:rPr lang="en-US" smtClean="0"/>
-              <a:t>13-Aug-24</a:t>
+              <a:t>15-Aug-24</a:t>
             </a:fld>
             <a:endParaRPr lang="en-US"/>
           </a:p>
@@ -1855,7 +2291,7 @@
           <a:p>
             <a:fld id="{82EF9A90-7641-4094-BE77-53E9358D236A}" type="datetimeFigureOut">
               <a:rPr lang="en-US" smtClean="0"/>
-              <a:t>13-Aug-24</a:t>
+              <a:t>15-Aug-24</a:t>
             </a:fld>
             <a:endParaRPr lang="en-US"/>
           </a:p>
@@ -2140,7 +2576,7 @@
           <a:p>
             <a:fld id="{82EF9A90-7641-4094-BE77-53E9358D236A}" type="datetimeFigureOut">
               <a:rPr lang="en-US" smtClean="0"/>
-              <a:t>13-Aug-24</a:t>
+              <a:t>15-Aug-24</a:t>
             </a:fld>
             <a:endParaRPr lang="en-US"/>
           </a:p>
@@ -2423,7 +2859,7 @@
           <a:p>
             <a:fld id="{82EF9A90-7641-4094-BE77-53E9358D236A}" type="datetimeFigureOut">
               <a:rPr lang="en-US" smtClean="0"/>
-              <a:t>13-Aug-24</a:t>
+              <a:t>15-Aug-24</a:t>
             </a:fld>
             <a:endParaRPr lang="en-US"/>
           </a:p>
@@ -2766,7 +3202,7 @@
           <a:p>
             <a:fld id="{82EF9A90-7641-4094-BE77-53E9358D236A}" type="datetimeFigureOut">
               <a:rPr lang="en-US" smtClean="0"/>
-              <a:t>13-Aug-24</a:t>
+              <a:t>15-Aug-24</a:t>
             </a:fld>
             <a:endParaRPr lang="en-US"/>
           </a:p>
@@ -3105,7 +3541,7 @@
           <a:p>
             <a:fld id="{82EF9A90-7641-4094-BE77-53E9358D236A}" type="datetimeFigureOut">
               <a:rPr lang="en-US" smtClean="0"/>
-              <a:t>13-Aug-24</a:t>
+              <a:t>15-Aug-24</a:t>
             </a:fld>
             <a:endParaRPr lang="en-US"/>
           </a:p>
@@ -3582,7 +4018,7 @@
           <a:p>
             <a:fld id="{82EF9A90-7641-4094-BE77-53E9358D236A}" type="datetimeFigureOut">
               <a:rPr lang="en-US" smtClean="0"/>
-              <a:t>13-Aug-24</a:t>
+              <a:t>15-Aug-24</a:t>
             </a:fld>
             <a:endParaRPr lang="en-US"/>
           </a:p>
@@ -3803,7 +4239,7 @@
           <a:p>
             <a:fld id="{82EF9A90-7641-4094-BE77-53E9358D236A}" type="datetimeFigureOut">
               <a:rPr lang="en-US" smtClean="0"/>
-              <a:t>13-Aug-24</a:t>
+              <a:t>15-Aug-24</a:t>
             </a:fld>
             <a:endParaRPr lang="en-US"/>
           </a:p>
@@ -3898,7 +4334,7 @@
           <a:p>
             <a:fld id="{82EF9A90-7641-4094-BE77-53E9358D236A}" type="datetimeFigureOut">
               <a:rPr lang="en-US" smtClean="0"/>
-              <a:t>13-Aug-24</a:t>
+              <a:t>15-Aug-24</a:t>
             </a:fld>
             <a:endParaRPr lang="en-US"/>
           </a:p>
@@ -4365,7 +4801,7 @@
           <a:p>
             <a:fld id="{82EF9A90-7641-4094-BE77-53E9358D236A}" type="datetimeFigureOut">
               <a:rPr lang="en-US" smtClean="0"/>
-              <a:t>13-Aug-24</a:t>
+              <a:t>15-Aug-24</a:t>
             </a:fld>
             <a:endParaRPr lang="en-US"/>
           </a:p>
@@ -4678,7 +5114,7 @@
           <a:p>
             <a:fld id="{82EF9A90-7641-4094-BE77-53E9358D236A}" type="datetimeFigureOut">
               <a:rPr lang="en-US" smtClean="0"/>
-              <a:t>13-Aug-24</a:t>
+              <a:t>15-Aug-24</a:t>
             </a:fld>
             <a:endParaRPr lang="en-US"/>
           </a:p>
@@ -4948,7 +5384,7 @@
           <a:p>
             <a:fld id="{82EF9A90-7641-4094-BE77-53E9358D236A}" type="datetimeFigureOut">
               <a:rPr lang="en-US" smtClean="0"/>
-              <a:t>13-Aug-24</a:t>
+              <a:t>15-Aug-24</a:t>
             </a:fld>
             <a:endParaRPr lang="en-US"/>
           </a:p>
@@ -5659,8 +6095,8 @@
         </p:nvSpPr>
         <p:spPr>
           <a:xfrm>
-            <a:off x="810000" y="2659091"/>
-            <a:ext cx="9953784" cy="2924479"/>
+            <a:off x="810000" y="2273790"/>
+            <a:ext cx="9953784" cy="3312817"/>
           </a:xfrm>
         </p:spPr>
         <p:txBody>
@@ -5671,15 +6107,11 @@
           <a:p>
             <a:r>
               <a:rPr lang="en-US" b="1" dirty="0"/>
-              <a:t>Overall Performance</a:t>
-            </a:r>
-            <a:r>
-              <a:rPr lang="en-US" dirty="0"/>
-              <a:t>:</a:t>
-            </a:r>
-          </a:p>
-          <a:p>
-            <a:endParaRPr lang="en-US" dirty="0"/>
+              <a:t>Overall Sales and Profit:</a:t>
+            </a:r>
+          </a:p>
+          <a:p>
+            <a:endParaRPr lang="en-US" b="1" dirty="0"/>
           </a:p>
           <a:p>
             <a:pPr>
@@ -5687,8 +6119,36 @@
               <a:buChar char="•"/>
             </a:pPr>
             <a:r>
+              <a:rPr lang="en-US" b="1" dirty="0"/>
+              <a:t>Financial Achievements</a:t>
+            </a:r>
+            <a:r>
               <a:rPr lang="en-US" dirty="0"/>
-              <a:t>FestMart achieved total sales of £2.30 million and a profit of £286.40 thousand between 2014 and 2017.</a:t>
+              <a:t>:</a:t>
+            </a:r>
+          </a:p>
+          <a:p>
+            <a:pPr lvl="1">
+              <a:buFont typeface="Arial" panose="020B0604020202020204" pitchFamily="34" charset="0"/>
+              <a:buChar char="•"/>
+            </a:pPr>
+            <a:r>
+              <a:rPr lang="en-US" dirty="0" err="1"/>
+              <a:t>FestMart</a:t>
+            </a:r>
+            <a:r>
+              <a:rPr lang="en-US" dirty="0"/>
+              <a:t> generated total sales of £2.30 million over the period from 2014 to 2017.</a:t>
+            </a:r>
+          </a:p>
+          <a:p>
+            <a:pPr lvl="1">
+              <a:buFont typeface="Arial" panose="020B0604020202020204" pitchFamily="34" charset="0"/>
+              <a:buChar char="•"/>
+            </a:pPr>
+            <a:r>
+              <a:rPr lang="en-US" dirty="0"/>
+              <a:t>The company achieved a net profit of £286.40 thousand during this time frame.</a:t>
             </a:r>
           </a:p>
         </p:txBody>
@@ -5769,8 +6229,8 @@
         </p:nvSpPr>
         <p:spPr>
           <a:xfrm>
-            <a:off x="810000" y="2659091"/>
-            <a:ext cx="9953784" cy="2924479"/>
+            <a:off x="809999" y="2272938"/>
+            <a:ext cx="11024949" cy="4585062"/>
           </a:xfrm>
         </p:spPr>
         <p:txBody>
@@ -5781,12 +6241,190 @@
           <a:p>
             <a:r>
               <a:rPr lang="en-US" b="1" dirty="0"/>
-              <a:t>Category Performance</a:t>
+              <a:t>Category Sales Performance</a:t>
             </a:r>
             <a:r>
               <a:rPr lang="en-US" dirty="0"/>
               <a:t>:</a:t>
             </a:r>
+          </a:p>
+          <a:p>
+            <a:pPr>
+              <a:buFont typeface="Arial" panose="020B0604020202020204" pitchFamily="34" charset="0"/>
+              <a:buChar char="•"/>
+            </a:pPr>
+            <a:endParaRPr kumimoji="0" lang="en-US" altLang="en-US" b="1" i="0" u="none" strike="noStrike" cap="none" normalizeH="0" baseline="0" dirty="0">
+              <a:ln>
+                <a:noFill/>
+              </a:ln>
+              <a:solidFill>
+                <a:schemeClr val="tx1"/>
+              </a:solidFill>
+              <a:effectLst/>
+              <a:latin typeface="Arial" panose="020B0604020202020204" pitchFamily="34" charset="0"/>
+            </a:endParaRPr>
+          </a:p>
+          <a:p>
+            <a:pPr>
+              <a:buFont typeface="Arial" panose="020B0604020202020204" pitchFamily="34" charset="0"/>
+              <a:buChar char="•"/>
+            </a:pPr>
+            <a:r>
+              <a:rPr kumimoji="0" lang="en-US" altLang="en-US" b="1" i="0" u="none" strike="noStrike" cap="none" normalizeH="0" baseline="0" dirty="0">
+                <a:ln>
+                  <a:noFill/>
+                </a:ln>
+                <a:solidFill>
+                  <a:schemeClr val="tx1"/>
+                </a:solidFill>
+                <a:effectLst/>
+                <a:latin typeface="Arial" panose="020B0604020202020204" pitchFamily="34" charset="0"/>
+              </a:rPr>
+              <a:t>Leading Categories:</a:t>
+            </a:r>
+          </a:p>
+          <a:p>
+            <a:pPr lvl="1">
+              <a:buFont typeface="Arial" panose="020B0604020202020204" pitchFamily="34" charset="0"/>
+              <a:buChar char="•"/>
+            </a:pPr>
+            <a:r>
+              <a:rPr kumimoji="0" lang="en-US" altLang="en-US" b="0" i="0" u="none" strike="noStrike" cap="none" normalizeH="0" baseline="0" dirty="0">
+                <a:ln>
+                  <a:noFill/>
+                </a:ln>
+                <a:solidFill>
+                  <a:schemeClr val="tx1"/>
+                </a:solidFill>
+                <a:effectLst/>
+                <a:latin typeface="Arial" panose="020B0604020202020204" pitchFamily="34" charset="0"/>
+              </a:rPr>
+              <a:t>The Technology category consistently dominated sales across most years.</a:t>
+            </a:r>
+          </a:p>
+          <a:p>
+            <a:pPr marL="0" marR="0" lvl="0" indent="0" algn="l" defTabSz="914400" rtl="0" eaLnBrk="0" fontAlgn="base" latinLnBrk="0" hangingPunct="0">
+              <a:lnSpc>
+                <a:spcPct val="100000"/>
+              </a:lnSpc>
+              <a:spcBef>
+                <a:spcPct val="0"/>
+              </a:spcBef>
+              <a:spcAft>
+                <a:spcPct val="0"/>
+              </a:spcAft>
+              <a:buClrTx/>
+              <a:buSzTx/>
+              <a:buFontTx/>
+              <a:buChar char="•"/>
+              <a:tabLst/>
+            </a:pPr>
+            <a:endParaRPr kumimoji="0" lang="en-US" altLang="en-US" sz="1800" b="1" i="0" u="none" strike="noStrike" cap="none" normalizeH="0" baseline="0" dirty="0">
+              <a:ln>
+                <a:noFill/>
+              </a:ln>
+              <a:solidFill>
+                <a:schemeClr val="tx1"/>
+              </a:solidFill>
+              <a:effectLst/>
+              <a:latin typeface="Arial" panose="020B0604020202020204" pitchFamily="34" charset="0"/>
+            </a:endParaRPr>
+          </a:p>
+          <a:p>
+            <a:pPr>
+              <a:buFont typeface="Arial" panose="020B0604020202020204" pitchFamily="34" charset="0"/>
+              <a:buChar char="•"/>
+            </a:pPr>
+            <a:r>
+              <a:rPr lang="en-US" altLang="en-US" b="1" dirty="0">
+                <a:latin typeface="Arial" panose="020B0604020202020204" pitchFamily="34" charset="0"/>
+              </a:rPr>
+              <a:t>Exception in 2015:</a:t>
+            </a:r>
+          </a:p>
+          <a:p>
+            <a:pPr lvl="1">
+              <a:buFont typeface="Arial" panose="020B0604020202020204" pitchFamily="34" charset="0"/>
+              <a:buChar char="•"/>
+            </a:pPr>
+            <a:r>
+              <a:rPr kumimoji="0" lang="en-US" altLang="en-US" b="0" i="0" u="none" strike="noStrike" cap="none" normalizeH="0" baseline="0" dirty="0">
+                <a:ln>
+                  <a:noFill/>
+                </a:ln>
+                <a:solidFill>
+                  <a:schemeClr val="tx1"/>
+                </a:solidFill>
+                <a:effectLst/>
+                <a:latin typeface="Arial" panose="020B0604020202020204" pitchFamily="34" charset="0"/>
+              </a:rPr>
+              <a:t>Furniture outperformed Technology, contributing 36.24% of total sales compared to Technology's 34.6%.</a:t>
+            </a:r>
+          </a:p>
+          <a:p>
+            <a:pPr defTabSz="914400" eaLnBrk="0" fontAlgn="base" hangingPunct="0">
+              <a:spcBef>
+                <a:spcPct val="0"/>
+              </a:spcBef>
+              <a:spcAft>
+                <a:spcPct val="0"/>
+              </a:spcAft>
+              <a:buClrTx/>
+            </a:pPr>
+            <a:endParaRPr kumimoji="0" lang="en-US" altLang="en-US" sz="1800" b="0" i="0" u="none" strike="noStrike" cap="none" normalizeH="0" baseline="0" dirty="0">
+              <a:ln>
+                <a:noFill/>
+              </a:ln>
+              <a:solidFill>
+                <a:schemeClr val="tx1"/>
+              </a:solidFill>
+              <a:effectLst/>
+              <a:latin typeface="Arial" panose="020B0604020202020204" pitchFamily="34" charset="0"/>
+            </a:endParaRPr>
+          </a:p>
+          <a:p>
+            <a:pPr>
+              <a:buFont typeface="Arial" panose="020B0604020202020204" pitchFamily="34" charset="0"/>
+              <a:buChar char="•"/>
+            </a:pPr>
+            <a:r>
+              <a:rPr kumimoji="0" lang="en-US" altLang="en-US" sz="1800" b="1" i="0" u="none" strike="noStrike" cap="none" normalizeH="0" baseline="0" dirty="0">
+                <a:ln>
+                  <a:noFill/>
+                </a:ln>
+                <a:solidFill>
+                  <a:schemeClr val="tx1"/>
+                </a:solidFill>
+                <a:effectLst/>
+                <a:latin typeface="Arial" panose="020B0604020202020204" pitchFamily="34" charset="0"/>
+              </a:rPr>
+              <a:t>Top Sub-Categories:</a:t>
+            </a:r>
+          </a:p>
+          <a:p>
+            <a:pPr lvl="1">
+              <a:buFont typeface="Arial" panose="020B0604020202020204" pitchFamily="34" charset="0"/>
+              <a:buChar char="•"/>
+            </a:pPr>
+            <a:r>
+              <a:rPr kumimoji="0" lang="en-US" altLang="en-US" b="0" i="0" u="none" strike="noStrike" cap="none" normalizeH="0" baseline="0" dirty="0">
+                <a:ln>
+                  <a:noFill/>
+                </a:ln>
+                <a:solidFill>
+                  <a:schemeClr val="tx1"/>
+                </a:solidFill>
+                <a:effectLst/>
+                <a:latin typeface="Arial" panose="020B0604020202020204" pitchFamily="34" charset="0"/>
+              </a:rPr>
+              <a:t>Standout performers included phones, chairs, storage, tables, and binders, which drove significant sales within their respective categories.</a:t>
+            </a:r>
+          </a:p>
+          <a:p>
+            <a:pPr marL="0" indent="0">
+              <a:buNone/>
+            </a:pPr>
+            <a:endParaRPr lang="en-US" dirty="0"/>
           </a:p>
           <a:p>
             <a:pPr>
@@ -5794,26 +6432,6 @@
               <a:buChar char="§"/>
             </a:pPr>
             <a:endParaRPr lang="en-US" dirty="0"/>
-          </a:p>
-          <a:p>
-            <a:pPr>
-              <a:buFont typeface="Wingdings" panose="05000000000000000000" pitchFamily="2" charset="2"/>
-              <a:buChar char="§"/>
-            </a:pPr>
-            <a:r>
-              <a:rPr lang="en-US" dirty="0"/>
-              <a:t>The Technology category consistently led sales, except in 2015 when Furniture accounted for 36.24% of total sales compared to Technology's 34.6%.</a:t>
-            </a:r>
-          </a:p>
-          <a:p>
-            <a:pPr>
-              <a:buFont typeface="Wingdings" panose="05000000000000000000" pitchFamily="2" charset="2"/>
-              <a:buChar char="§"/>
-            </a:pPr>
-            <a:r>
-              <a:rPr lang="en-US" dirty="0"/>
-              <a:t>Top-performing sub-categories included phones, chairs, storage, tables, and binders.</a:t>
-            </a:r>
           </a:p>
         </p:txBody>
       </p:sp>
@@ -5893,8 +6511,8 @@
         </p:nvSpPr>
         <p:spPr>
           <a:xfrm>
-            <a:off x="810000" y="2659091"/>
-            <a:ext cx="9953784" cy="2924479"/>
+            <a:off x="809999" y="2493880"/>
+            <a:ext cx="10450899" cy="3155357"/>
           </a:xfrm>
         </p:spPr>
         <p:txBody>
@@ -5905,7 +6523,7 @@
           <a:p>
             <a:r>
               <a:rPr lang="en-US" b="1" dirty="0"/>
-              <a:t>Regional Sales</a:t>
+              <a:t>Top Performing Regions</a:t>
             </a:r>
             <a:r>
               <a:rPr lang="en-US" dirty="0"/>
@@ -5913,6 +6531,9 @@
             </a:r>
           </a:p>
           <a:p>
+            <a:pPr marL="0" indent="0">
+              <a:buNone/>
+            </a:pPr>
             <a:endParaRPr lang="en-US" dirty="0"/>
           </a:p>
           <a:p>
@@ -5921,8 +6542,28 @@
               <a:buChar char="•"/>
             </a:pPr>
             <a:r>
+              <a:rPr lang="en-US" b="1" dirty="0"/>
+              <a:t>West and East Regions:</a:t>
+            </a:r>
+          </a:p>
+          <a:p>
+            <a:pPr lvl="1">
+              <a:buFont typeface="Arial" panose="020B0604020202020204" pitchFamily="34" charset="0"/>
+              <a:buChar char="•"/>
+            </a:pPr>
+            <a:r>
               <a:rPr lang="en-US" dirty="0"/>
-              <a:t>The West and East regions were the top performers, with sales of £725.46 thousand and £678.78 thousand, respectively.</a:t>
+              <a:t>The West region led with sales totaling £725.46 thousand.</a:t>
+            </a:r>
+          </a:p>
+          <a:p>
+            <a:pPr lvl="1">
+              <a:buFont typeface="Arial" panose="020B0604020202020204" pitchFamily="34" charset="0"/>
+              <a:buChar char="•"/>
+            </a:pPr>
+            <a:r>
+              <a:rPr lang="en-US" dirty="0"/>
+              <a:t>Close behind, the East region achieved sales of £678.78 thousand.</a:t>
             </a:r>
           </a:p>
         </p:txBody>
@@ -6003,19 +6644,19 @@
         </p:nvSpPr>
         <p:spPr>
           <a:xfrm>
-            <a:off x="810000" y="2659091"/>
-            <a:ext cx="9953784" cy="2924479"/>
+            <a:off x="810000" y="2384771"/>
+            <a:ext cx="9953784" cy="3751721"/>
           </a:xfrm>
         </p:spPr>
         <p:txBody>
           <a:bodyPr>
-            <a:normAutofit/>
+            <a:normAutofit lnSpcReduction="10000"/>
           </a:bodyPr>
           <a:lstStyle/>
           <a:p>
             <a:r>
               <a:rPr lang="en-US" b="1" dirty="0"/>
-              <a:t>Region with least Sales and Profit</a:t>
+              <a:t>Region Sales and Profit Comparison</a:t>
             </a:r>
             <a:r>
               <a:rPr lang="en-US" dirty="0"/>
@@ -6031,8 +6672,61 @@
               <a:buChar char="•"/>
             </a:pPr>
             <a:r>
+              <a:rPr lang="en-US" b="1" dirty="0"/>
+              <a:t>Lowest Sales and Orders:</a:t>
+            </a:r>
+            <a:endParaRPr lang="en-US" dirty="0"/>
+          </a:p>
+          <a:p>
+            <a:pPr marL="742950" lvl="1" indent="-285750">
+              <a:buFont typeface="Arial" panose="020B0604020202020204" pitchFamily="34" charset="0"/>
+              <a:buChar char="•"/>
+            </a:pPr>
+            <a:r>
               <a:rPr lang="en-US" dirty="0"/>
-              <a:t>The South region has the least sales (£391.72 thousand) and orders (6,209) compare to Central region with £501.24 thousand sales and 8,780 orders. But upon review of the two regions, South has higher profit margin than Central region by 17.44% difference because Central region suffer losses on Furniture category whereas South region suffer no loss on all categories. </a:t>
+              <a:t>The South region recorded the lowest sales (£391.72 thousand) and the fewest orders (6,209) compared to the Central region, which had £501.24 thousand in sales and 8,780 orders.</a:t>
+            </a:r>
+          </a:p>
+          <a:p>
+            <a:pPr marL="742950" lvl="1" indent="-285750">
+              <a:buFont typeface="Arial" panose="020B0604020202020204" pitchFamily="34" charset="0"/>
+              <a:buChar char="•"/>
+            </a:pPr>
+            <a:endParaRPr lang="en-US" dirty="0"/>
+          </a:p>
+          <a:p>
+            <a:pPr>
+              <a:buFont typeface="Arial" panose="020B0604020202020204" pitchFamily="34" charset="0"/>
+              <a:buChar char="•"/>
+            </a:pPr>
+            <a:r>
+              <a:rPr lang="en-US" b="1" dirty="0"/>
+              <a:t>Profit Margin Analysis:</a:t>
+            </a:r>
+            <a:endParaRPr lang="en-US" dirty="0"/>
+          </a:p>
+          <a:p>
+            <a:pPr marL="742950" lvl="1" indent="-285750">
+              <a:buFont typeface="Arial" panose="020B0604020202020204" pitchFamily="34" charset="0"/>
+              <a:buChar char="•"/>
+            </a:pPr>
+            <a:r>
+              <a:rPr lang="en-US" dirty="0"/>
+              <a:t>Despite lower sales, the South region outperformed the Central region in terms of profit margin, showing a 17.44% higher margin.</a:t>
+            </a:r>
+          </a:p>
+          <a:p>
+            <a:pPr marL="742950" lvl="1" indent="-285750">
+              <a:buFont typeface="Arial" panose="020B0604020202020204" pitchFamily="34" charset="0"/>
+              <a:buChar char="•"/>
+            </a:pPr>
+            <a:r>
+              <a:rPr lang="en-US" b="1" dirty="0"/>
+              <a:t>Key Factor:</a:t>
+            </a:r>
+            <a:r>
+              <a:rPr lang="en-US" dirty="0"/>
+              <a:t> The Central region experienced losses in the Furniture category due to excessive discounting, while the South region maintained profitability across all categories.</a:t>
             </a:r>
           </a:p>
         </p:txBody>
@@ -6123,26 +6817,75 @@
           </a:bodyPr>
           <a:lstStyle/>
           <a:p>
-            <a:r>
-              <a:rPr lang="en-US" b="1" dirty="0"/>
-              <a:t>Discount Impact on Profit</a:t>
-            </a:r>
-            <a:r>
-              <a:rPr lang="en-US" dirty="0"/>
-              <a:t>:</a:t>
-            </a:r>
-          </a:p>
-          <a:p>
-            <a:endParaRPr lang="en-US" dirty="0"/>
-          </a:p>
-          <a:p>
             <a:pPr>
               <a:buFont typeface="Arial" panose="020B0604020202020204" pitchFamily="34" charset="0"/>
               <a:buChar char="•"/>
             </a:pPr>
             <a:r>
+              <a:rPr lang="en-US" b="1" dirty="0"/>
+              <a:t>Profitability Insights:</a:t>
+            </a:r>
+          </a:p>
+          <a:p>
+            <a:pPr>
+              <a:buFont typeface="Arial" panose="020B0604020202020204" pitchFamily="34" charset="0"/>
+              <a:buChar char="•"/>
+            </a:pPr>
+            <a:endParaRPr lang="en-US" b="1" dirty="0"/>
+          </a:p>
+          <a:p>
+            <a:pPr lvl="1">
+              <a:buFont typeface="Arial" panose="020B0604020202020204" pitchFamily="34" charset="0"/>
+              <a:buChar char="•"/>
+            </a:pPr>
+            <a:r>
               <a:rPr lang="en-US" dirty="0"/>
-              <a:t>Higher profits were achieved on sales with lower discounts compared to those with higher discounts.</a:t>
+              <a:t>Sales with lower discounts consistently resulted in higher profits.</a:t>
+            </a:r>
+          </a:p>
+          <a:p>
+            <a:pPr lvl="1">
+              <a:buFont typeface="Arial" panose="020B0604020202020204" pitchFamily="34" charset="0"/>
+              <a:buChar char="•"/>
+            </a:pPr>
+            <a:r>
+              <a:rPr lang="en-US" dirty="0"/>
+              <a:t>In contrast, higher discounts were associated with reduced profitability.</a:t>
+            </a:r>
+          </a:p>
+        </p:txBody>
+      </p:sp>
+      <p:sp>
+        <p:nvSpPr>
+          <p:cNvPr id="5" name="TextBox 4">
+            <a:extLst>
+              <a:ext uri="{FF2B5EF4-FFF2-40B4-BE49-F238E27FC236}">
+                <a16:creationId xmlns:a16="http://schemas.microsoft.com/office/drawing/2014/main" id="{6C50B87E-53F3-46D5-9C45-C23C4219B386}"/>
+              </a:ext>
+            </a:extLst>
+          </p:cNvPr>
+          <p:cNvSpPr txBox="1"/>
+          <p:nvPr/>
+        </p:nvSpPr>
+        <p:spPr>
+          <a:xfrm>
+            <a:off x="5849655" y="2044966"/>
+            <a:ext cx="5799550" cy="369332"/>
+          </a:xfrm>
+          <a:prstGeom prst="rect">
+            <a:avLst/>
+          </a:prstGeom>
+          <a:noFill/>
+        </p:spPr>
+        <p:txBody>
+          <a:bodyPr wrap="square">
+            <a:spAutoFit/>
+          </a:bodyPr>
+          <a:lstStyle/>
+          <a:p>
+            <a:r>
+              <a:rPr lang="en-US" i="1" dirty="0"/>
+              <a:t>Correlation Between Discounts and Profit</a:t>
             </a:r>
           </a:p>
         </p:txBody>
@@ -6223,8 +6966,8 @@
         </p:nvSpPr>
         <p:spPr>
           <a:xfrm>
-            <a:off x="810000" y="2659091"/>
-            <a:ext cx="9953784" cy="2924479"/>
+            <a:off x="810000" y="1957633"/>
+            <a:ext cx="9953784" cy="3654027"/>
           </a:xfrm>
         </p:spPr>
         <p:txBody>
@@ -6235,7 +6978,7 @@
           <a:p>
             <a:r>
               <a:rPr lang="en-US" b="1" dirty="0"/>
-              <a:t>Sales Seasonality</a:t>
+              <a:t>Seasonal Sales Trends</a:t>
             </a:r>
             <a:r>
               <a:rPr lang="en-US" dirty="0"/>
@@ -6251,8 +6994,18 @@
               <a:buChar char="•"/>
             </a:pPr>
             <a:r>
-              <a:rPr lang="en-US" dirty="0"/>
-              <a:t>Sales exhibited seasonal patterns, with noticeable peaks and troughs at certain times of the year.</a:t>
+              <a:rPr lang="en-US" sz="2000" dirty="0"/>
+              <a:t>Seasonal Patterns:</a:t>
+            </a:r>
+          </a:p>
+          <a:p>
+            <a:pPr lvl="2" indent="-285750">
+              <a:buFont typeface="Arial" panose="020B0604020202020204" pitchFamily="34" charset="0"/>
+              <a:buChar char="•"/>
+            </a:pPr>
+            <a:r>
+              <a:rPr lang="en-US" sz="1600" dirty="0"/>
+              <a:t>Sales followed distinct seasonal patterns, with clear peaks and troughs observed at specific times throughout the year.</a:t>
             </a:r>
           </a:p>
         </p:txBody>
@@ -6707,6 +7460,301 @@
 </a:theme>
 </file>
 
+<file path=ppt/theme/theme2.xml><?xml version="1.0" encoding="utf-8"?>
+<a:theme xmlns:a="http://schemas.openxmlformats.org/drawingml/2006/main" name="Office Theme">
+  <a:themeElements>
+    <a:clrScheme name="Office">
+      <a:dk1>
+        <a:sysClr val="windowText" lastClr="000000"/>
+      </a:dk1>
+      <a:lt1>
+        <a:sysClr val="window" lastClr="FFFFFF"/>
+      </a:lt1>
+      <a:dk2>
+        <a:srgbClr val="44546A"/>
+      </a:dk2>
+      <a:lt2>
+        <a:srgbClr val="E7E6E6"/>
+      </a:lt2>
+      <a:accent1>
+        <a:srgbClr val="4472C4"/>
+      </a:accent1>
+      <a:accent2>
+        <a:srgbClr val="ED7D31"/>
+      </a:accent2>
+      <a:accent3>
+        <a:srgbClr val="A5A5A5"/>
+      </a:accent3>
+      <a:accent4>
+        <a:srgbClr val="FFC000"/>
+      </a:accent4>
+      <a:accent5>
+        <a:srgbClr val="5B9BD5"/>
+      </a:accent5>
+      <a:accent6>
+        <a:srgbClr val="70AD47"/>
+      </a:accent6>
+      <a:hlink>
+        <a:srgbClr val="0563C1"/>
+      </a:hlink>
+      <a:folHlink>
+        <a:srgbClr val="954F72"/>
+      </a:folHlink>
+    </a:clrScheme>
+    <a:fontScheme name="Office">
+      <a:majorFont>
+        <a:latin typeface="Calibri Light" panose="020F0302020204030204"/>
+        <a:ea typeface=""/>
+        <a:cs typeface=""/>
+        <a:font script="Jpan" typeface="游ゴシック Light"/>
+        <a:font script="Hang" typeface="맑은 고딕"/>
+        <a:font script="Hans" typeface="等线 Light"/>
+        <a:font script="Hant" typeface="新細明體"/>
+        <a:font script="Arab" typeface="Times New Roman"/>
+        <a:font script="Hebr" typeface="Times New Roman"/>
+        <a:font script="Thai" typeface="Angsana New"/>
+        <a:font script="Ethi" typeface="Nyala"/>
+        <a:font script="Beng" typeface="Vrinda"/>
+        <a:font script="Gujr" typeface="Shruti"/>
+        <a:font script="Khmr" typeface="MoolBoran"/>
+        <a:font script="Knda" typeface="Tunga"/>
+        <a:font script="Guru" typeface="Raavi"/>
+        <a:font script="Cans" typeface="Euphemia"/>
+        <a:font script="Cher" typeface="Plantagenet Cherokee"/>
+        <a:font script="Yiii" typeface="Microsoft Yi Baiti"/>
+        <a:font script="Tibt" typeface="Microsoft Himalaya"/>
+        <a:font script="Thaa" typeface="MV Boli"/>
+        <a:font script="Deva" typeface="Mangal"/>
+        <a:font script="Telu" typeface="Gautami"/>
+        <a:font script="Taml" typeface="Latha"/>
+        <a:font script="Syrc" typeface="Estrangelo Edessa"/>
+        <a:font script="Orya" typeface="Kalinga"/>
+        <a:font script="Mlym" typeface="Kartika"/>
+        <a:font script="Laoo" typeface="DokChampa"/>
+        <a:font script="Sinh" typeface="Iskoola Pota"/>
+        <a:font script="Mong" typeface="Mongolian Baiti"/>
+        <a:font script="Viet" typeface="Times New Roman"/>
+        <a:font script="Uigh" typeface="Microsoft Uighur"/>
+        <a:font script="Geor" typeface="Sylfaen"/>
+        <a:font script="Armn" typeface="Arial"/>
+        <a:font script="Bugi" typeface="Leelawadee UI"/>
+        <a:font script="Bopo" typeface="Microsoft JhengHei"/>
+        <a:font script="Java" typeface="Javanese Text"/>
+        <a:font script="Lisu" typeface="Segoe UI"/>
+        <a:font script="Mymr" typeface="Myanmar Text"/>
+        <a:font script="Nkoo" typeface="Ebrima"/>
+        <a:font script="Olck" typeface="Nirmala UI"/>
+        <a:font script="Osma" typeface="Ebrima"/>
+        <a:font script="Phag" typeface="Phagspa"/>
+        <a:font script="Syrn" typeface="Estrangelo Edessa"/>
+        <a:font script="Syrj" typeface="Estrangelo Edessa"/>
+        <a:font script="Syre" typeface="Estrangelo Edessa"/>
+        <a:font script="Sora" typeface="Nirmala UI"/>
+        <a:font script="Tale" typeface="Microsoft Tai Le"/>
+        <a:font script="Talu" typeface="Microsoft New Tai Lue"/>
+        <a:font script="Tfng" typeface="Ebrima"/>
+      </a:majorFont>
+      <a:minorFont>
+        <a:latin typeface="Calibri" panose="020F0502020204030204"/>
+        <a:ea typeface=""/>
+        <a:cs typeface=""/>
+        <a:font script="Jpan" typeface="游ゴシック"/>
+        <a:font script="Hang" typeface="맑은 고딕"/>
+        <a:font script="Hans" typeface="等线"/>
+        <a:font script="Hant" typeface="新細明體"/>
+        <a:font script="Arab" typeface="Arial"/>
+        <a:font script="Hebr" typeface="Arial"/>
+        <a:font script="Thai" typeface="Cordia New"/>
+        <a:font script="Ethi" typeface="Nyala"/>
+        <a:font script="Beng" typeface="Vrinda"/>
+        <a:font script="Gujr" typeface="Shruti"/>
+        <a:font script="Khmr" typeface="DaunPenh"/>
+        <a:font script="Knda" typeface="Tunga"/>
+        <a:font script="Guru" typeface="Raavi"/>
+        <a:font script="Cans" typeface="Euphemia"/>
+        <a:font script="Cher" typeface="Plantagenet Cherokee"/>
+        <a:font script="Yiii" typeface="Microsoft Yi Baiti"/>
+        <a:font script="Tibt" typeface="Microsoft Himalaya"/>
+        <a:font script="Thaa" typeface="MV Boli"/>
+        <a:font script="Deva" typeface="Mangal"/>
+        <a:font script="Telu" typeface="Gautami"/>
+        <a:font script="Taml" typeface="Latha"/>
+        <a:font script="Syrc" typeface="Estrangelo Edessa"/>
+        <a:font script="Orya" typeface="Kalinga"/>
+        <a:font script="Mlym" typeface="Kartika"/>
+        <a:font script="Laoo" typeface="DokChampa"/>
+        <a:font script="Sinh" typeface="Iskoola Pota"/>
+        <a:font script="Mong" typeface="Mongolian Baiti"/>
+        <a:font script="Viet" typeface="Arial"/>
+        <a:font script="Uigh" typeface="Microsoft Uighur"/>
+        <a:font script="Geor" typeface="Sylfaen"/>
+        <a:font script="Armn" typeface="Arial"/>
+        <a:font script="Bugi" typeface="Leelawadee UI"/>
+        <a:font script="Bopo" typeface="Microsoft JhengHei"/>
+        <a:font script="Java" typeface="Javanese Text"/>
+        <a:font script="Lisu" typeface="Segoe UI"/>
+        <a:font script="Mymr" typeface="Myanmar Text"/>
+        <a:font script="Nkoo" typeface="Ebrima"/>
+        <a:font script="Olck" typeface="Nirmala UI"/>
+        <a:font script="Osma" typeface="Ebrima"/>
+        <a:font script="Phag" typeface="Phagspa"/>
+        <a:font script="Syrn" typeface="Estrangelo Edessa"/>
+        <a:font script="Syrj" typeface="Estrangelo Edessa"/>
+        <a:font script="Syre" typeface="Estrangelo Edessa"/>
+        <a:font script="Sora" typeface="Nirmala UI"/>
+        <a:font script="Tale" typeface="Microsoft Tai Le"/>
+        <a:font script="Talu" typeface="Microsoft New Tai Lue"/>
+        <a:font script="Tfng" typeface="Ebrima"/>
+      </a:minorFont>
+    </a:fontScheme>
+    <a:fmtScheme name="Office">
+      <a:fillStyleLst>
+        <a:solidFill>
+          <a:schemeClr val="phClr"/>
+        </a:solidFill>
+        <a:gradFill rotWithShape="1">
+          <a:gsLst>
+            <a:gs pos="0">
+              <a:schemeClr val="phClr">
+                <a:lumMod val="110000"/>
+                <a:satMod val="105000"/>
+                <a:tint val="67000"/>
+              </a:schemeClr>
+            </a:gs>
+            <a:gs pos="50000">
+              <a:schemeClr val="phClr">
+                <a:lumMod val="105000"/>
+                <a:satMod val="103000"/>
+                <a:tint val="73000"/>
+              </a:schemeClr>
+            </a:gs>
+            <a:gs pos="100000">
+              <a:schemeClr val="phClr">
+                <a:lumMod val="105000"/>
+                <a:satMod val="109000"/>
+                <a:tint val="81000"/>
+              </a:schemeClr>
+            </a:gs>
+          </a:gsLst>
+          <a:lin ang="5400000" scaled="0"/>
+        </a:gradFill>
+        <a:gradFill rotWithShape="1">
+          <a:gsLst>
+            <a:gs pos="0">
+              <a:schemeClr val="phClr">
+                <a:satMod val="103000"/>
+                <a:lumMod val="102000"/>
+                <a:tint val="94000"/>
+              </a:schemeClr>
+            </a:gs>
+            <a:gs pos="50000">
+              <a:schemeClr val="phClr">
+                <a:satMod val="110000"/>
+                <a:lumMod val="100000"/>
+                <a:shade val="100000"/>
+              </a:schemeClr>
+            </a:gs>
+            <a:gs pos="100000">
+              <a:schemeClr val="phClr">
+                <a:lumMod val="99000"/>
+                <a:satMod val="120000"/>
+                <a:shade val="78000"/>
+              </a:schemeClr>
+            </a:gs>
+          </a:gsLst>
+          <a:lin ang="5400000" scaled="0"/>
+        </a:gradFill>
+      </a:fillStyleLst>
+      <a:lnStyleLst>
+        <a:ln w="6350" cap="flat" cmpd="sng" algn="ctr">
+          <a:solidFill>
+            <a:schemeClr val="phClr"/>
+          </a:solidFill>
+          <a:prstDash val="solid"/>
+          <a:miter lim="800000"/>
+        </a:ln>
+        <a:ln w="12700" cap="flat" cmpd="sng" algn="ctr">
+          <a:solidFill>
+            <a:schemeClr val="phClr"/>
+          </a:solidFill>
+          <a:prstDash val="solid"/>
+          <a:miter lim="800000"/>
+        </a:ln>
+        <a:ln w="19050" cap="flat" cmpd="sng" algn="ctr">
+          <a:solidFill>
+            <a:schemeClr val="phClr"/>
+          </a:solidFill>
+          <a:prstDash val="solid"/>
+          <a:miter lim="800000"/>
+        </a:ln>
+      </a:lnStyleLst>
+      <a:effectStyleLst>
+        <a:effectStyle>
+          <a:effectLst/>
+        </a:effectStyle>
+        <a:effectStyle>
+          <a:effectLst/>
+        </a:effectStyle>
+        <a:effectStyle>
+          <a:effectLst>
+            <a:outerShdw blurRad="57150" dist="19050" dir="5400000" algn="ctr" rotWithShape="0">
+              <a:srgbClr val="000000">
+                <a:alpha val="63000"/>
+              </a:srgbClr>
+            </a:outerShdw>
+          </a:effectLst>
+        </a:effectStyle>
+      </a:effectStyleLst>
+      <a:bgFillStyleLst>
+        <a:solidFill>
+          <a:schemeClr val="phClr"/>
+        </a:solidFill>
+        <a:solidFill>
+          <a:schemeClr val="phClr">
+            <a:tint val="95000"/>
+            <a:satMod val="170000"/>
+          </a:schemeClr>
+        </a:solidFill>
+        <a:gradFill rotWithShape="1">
+          <a:gsLst>
+            <a:gs pos="0">
+              <a:schemeClr val="phClr">
+                <a:tint val="93000"/>
+                <a:satMod val="150000"/>
+                <a:shade val="98000"/>
+                <a:lumMod val="102000"/>
+              </a:schemeClr>
+            </a:gs>
+            <a:gs pos="50000">
+              <a:schemeClr val="phClr">
+                <a:tint val="98000"/>
+                <a:satMod val="130000"/>
+                <a:shade val="90000"/>
+                <a:lumMod val="103000"/>
+              </a:schemeClr>
+            </a:gs>
+            <a:gs pos="100000">
+              <a:schemeClr val="phClr">
+                <a:shade val="63000"/>
+                <a:satMod val="120000"/>
+              </a:schemeClr>
+            </a:gs>
+          </a:gsLst>
+          <a:lin ang="5400000" scaled="0"/>
+        </a:gradFill>
+      </a:bgFillStyleLst>
+    </a:fmtScheme>
+  </a:themeElements>
+  <a:objectDefaults/>
+  <a:extraClrSchemeLst/>
+  <a:extLst>
+    <a:ext uri="{05A4C25C-085E-4340-85A3-A5531E510DB2}">
+      <thm15:themeFamily xmlns:thm15="http://schemas.microsoft.com/office/thememl/2012/main" name="Office Theme" id="{62F939B6-93AF-4DB8-9C6B-D6C7DFDC589F}" vid="{4A3C46E8-61CC-4603-A589-7422A47A8E4A}"/>
+    </a:ext>
+  </a:extLst>
+</a:theme>
+</file>
+
 <file path=ppt/webextensions/webextension1.xml><?xml version="1.0" encoding="utf-8"?>
 <we:webextension xmlns:we="http://schemas.microsoft.com/office/webextensions/webextension/2010/11" id="{cc71f3d5-1bfe-4397-a1d3-56d35d77e62e}">
   <we:reference id="WA200003233" version="2.0.0.3" store="en-US" storeType="OMEX"/>
@@ -6714,7 +7762,7 @@
   <we:properties>
     <we:property name="Microsoft.Office.CampaignId" value="&quot;none&quot;"/>
     <we:property name="backgroundColor" value="&quot;#FFFFFF&quot;"/>
-    <we:property name="bookmark" value="&quot;H4sIAAAAAAAAA+1a31PbOBD+VzJ+zt3IkmVZfbvS3txN6V0POtwwHR70Y5W4deyMLbdwDP/7rayEQkgJLSmEaXkAe71a7X7far2SOU9s2c0rdfaXmkHyLHneNB9mqv0wypJxUkdZpoTiBSmIEVIUgktQBJ82c182dZc8O0+8aifgj8quV1UwhMJ3CUV1J3ROteUWh+H4IjkZJ6qq3qhJ0HGq6mCczKHtmlpV5X8QTeAj3/ZwMU7gdF41rQoTHXrlIUz2EdXxHh1Lf005OqKMLz/CIRgfxYxDyoAQV7hUpVIzzXNU66LC4PBalWB7mH+vqb0qa5wnyCBVArWFYqk0RcEKWfAg78p6Ui08/jz27dk8YObh1OvmNMCk3+PEwdLFBUZknRWQS6CapMpZKQjTYbQrK7+YUJ+9PJ23CCECG63tYeiTpi0NzjSA0kIXMThP9pqqnw1XL6/JD5u+NXAAbnhU+9KfoaW/WxtmCZ68aRtEfpAu7J8N8mnzaa8FlNjkGbkYXzrxm/2oaoPSVQ9eg+r6Fu7qwis4G83ikBuOvG28qkaHqlo8uu7LCUpuRd02de/3pqr114HHmxD387MB1Bdlu8wVOl5x+bvFcnGyTFRUeX8lFS+xD65tmcyTIeUkdZoTm0OqaW40B5ulG1Pu8dkeP1j6H/b6l1uWwMa0M4MPP3reraAYcw+rLBWCMppLopRgJhf2B829Ya7Ry1MwfaBj1aEDmIThP9Nva0DGDOSp4blOnSs4I5wrLmjxgC/cF6FrWfHwNfYX0x1/1z6WL6P942/z5v60HINqv2X9KdRdu/q2nfi35VJM9rU991eU26gX1I6WXTbWit/bZjYMWGwSguZ1p8ZJxIKE9f7vFEJWDOHVtvSXBM3mqi271btXZY04s3GyD87fmcl4MzjzJRoPysl0MLhfYlCRuCNV9WEUJWmxH+rTxcDvzqTSgorDqjTQLpSuZlUyA9xqhYsJ1DEoxHkeZy6h+0z29avt0/nnCkDd3RN6I3c460BUsPnuS/xlgb+Tk4uY+/HXONGK5CwFlvIsT7WQNE/hkcv9Pz3WBvg++TDE7HRBmaXUUlFQrTQNi3m3mqz1ZX1za6Nau1M9TYwjJBsWW2lYRiVoCdIYmhaOyR2D/Zt20TsHencJuXAcqDWCSwoZk9Y6QnYI8hdlZ5q+9k8e9SuBLICXknHLiXEZUU5kimTZDgGPAlc+fdgvw4ig85Qy5kzucPPiiMwyl7OdAB0vbW/8aNnLjv7AVgs6vwhgdLB8Cz5NMu4YXiRJ5Y5rlmvBuXQgibbi4VbGXt/5BlvCUQeTGSwKz22RfCr9NIbTjg7A9209RLOl90QwkhUA1qXApS4K3HgDNiQ/99ubK9VjOHPL++rnjvtuO25paCEUIznl2JYQrbPM7EqNXtaqkWvakZ/CKB6NXSkCWNNiFdje+qdGMCNzqfGPFsZm1G3egD1UPfwyAPcug6r3zSFUCMXRlafhO+YNiHTOBU9TalNBVQ5plrPdyJlYFZYgbvGlICl3loRPnmCoZJSa9KvOpb5bxPEs+bg5fuo9y41AYndCMo0tpLY5c7kqCkUWH7pvL6+Dv89779GbG1wKV1CROcZBytzq1Cma3dOk1RqLp86l5Ao0Mbgw7msSe7FMWopxM0UIFqVCP1wZ2rzGrnxCe5r5thLG4kSECSqELDiIIrdguDBiI4/dVM1hlcCBw3XHnk3vu7ky8EbVsObsE2lTtY3HXzCwu/b4cPjPk+XxL/78DwHj26UHIwAA&quot;"/>
+    <we:property name="bookmark" value="&quot;H4sIAAAAAAAAA+1a227bRhD9FYLPQsG9c/PW2ClaxG5TO0hhBH7Yy6zEhCIFculYNfzv3SUlR5av9U0yEj0I5Gg5O+fM2eEsqbPUFu2sVPM/1RTSN+nbuv46Vc3XhKajtBpslEuGJOYIctAgNTKchV/rmS/qqk3fnKVeNWPwn4q2U2V0FIyfUyeYUKAVIiQ31FEwAqXHo1SV5Qc1jmOcKlsYpTNo2rpSZfEvDC7CT77p4HyUwumsrBsVJzr0ykOc7CQMD+chMPQLCXEo44sTOATjByvBFkvLNKGMS2IEESgLw9phQB/vtUOi6376nbryqqjCNNFmwHGNLcMyIMkcMzm10d4W1bhcBPz92o/zWaTMw6nX9WlkSX8JE0dP5+cBEOU0V05iwwmmjittaR6vdkXpFxPq+bvTWRMYDLwO3nYC8nHdFCbM1HPSQDtQcJbu1GU37Y/eXbIf1l1j4ABc/1PlCz8Pnv5qbJwlRvKhqQPxvXXhf97bJ/W3nQaCJaDMzkcXQfxqT1RlgnU9gn1QbdfAfUN4D/NkOlxyJZCPtVdlEgyu8NcEcxwst9Ju66rzOxPV+MvMh5MI/O28Z3W3aJZiwaO1mJ8PzPnxUqrB9GVFjBfsx9ieOJ3HvegIpZhZ7ajBXCmXGc3InaLbgnyPXmwFHE6KWbJfW3iI6kwfwA8vu1UOB93RUGY1lRIYQkwZTgXiL1jsDlUJbfLuFEwX8a/HewDjePlrr3k/nPrum9ZBg8IwLHDmjLA2oxk3ytkX1OBubFrWItwP/cVk23W3uWCSvaOHxfP4zByBah6yBlUYe+0KfGrt3yanRc11CFNJkdOSUYwMVZi+hnv93XVONfZqPy0YCxsTxUiecyLzPDdoO1qbhZaP6qPkYJm0RyPeSEm/iiRKLVCnGNVc0FxaZB0WSmZiK6gflLZbtKbuqifS2gZvpitAlsQTQ5zjYU/NKceZpezuPeTLEb/SHb5m2i9gDKQTC1I5Z6TGBHOXmyzTW0F6OLSd8cnyrpL8Xown0Ppk6JNef/G5B7ohRTkIwjgROleYaEuJki+3Lna61tdTaJIWxlNYlJ3bgHwr/OQymqe7K7oM0SBVKnluQYAkztzd9L6EWA/gBKoOkn3VjIsqcXWTDP36QIefwHNQshHlPgDqotIQYZASnADiItM54whtjYxXITyTeIk1JKMiC9/AQGRYZtvUwS4ZekLEoVmneYYyzKxSudPaGLZFiG/blr2W1XgVybDYJEc5yQFlVGOtJZLhtvHz8cB9muhNhvPzEcFjHhGwHHCGDDUMMeEQCltm2Lpys9nXASs3v5+voB5F4OIpLBEKU21zi0FKyITE7v9IbhgXh31avv0NvP3W1NP+gsXL6zjy8joYpUNasgj9nwlEWnuIlS38hWCmM9UU7frZ+6IKKSejdA+cv7eyhpM+mJsqx0Hom3qHe0UANWjokyq7eFVYmPleTNV5L7WtqV6LVByWhYFmMWhV32noiMa9ZsdQDaACz7Nh5gLa78m+fPT06fxjjaD2/qK+M3dh1j5R0efnm/JHY/6Oj4cOY/E1uv7fEJttNP7uQpWC59FDjxk7gsKg0NAi5ByIsJ3pnxDe7rovS2877wOeKy5BcWA2AyEY0pI5mePHuqRG6Rw44LDtynLObK4e6xJLaZUhhGnMwErMtbjbZTtRM1j31bu7bpnVnW9nysAHVcE1ay1oRVUW7OK4uaHc9P/AWZab8PkPTUJgcA8kAAA=&quot;"/>
     <we:property name="creatorSessionId" value="&quot;ec162807-dd07-4654-880e-1d160ea8f395&quot;"/>
     <we:property name="creatorTenantId" value="&quot;66b3f0c2-8bc6-451e-9603-986f618ae682&quot;"/>
     <we:property name="creatorUserId" value="&quot;10032000CD2E2EEE&quot;"/>
@@ -6723,12 +7771,12 @@
     <we:property name="initialStateBookmark" value="&quot;H4sIAAAAAAAAA+1abVPbOBD+Kxl/zt3YkmVZ/dZSbu4GaHukww3TYW70skrcOnbGllvSTv77rayEQqCEKymEafkA9nq12n320Xol8yUyRTsr5fyVnEL0LHpR1x+msvkwSKNhVC1lr18fHD0/Pvj31fOjfRTXM1fUVRs9+xI52YzBnRRtJ0tvAYXvzoaRLMs3cuzvrCxbGEYzaNq6kmXxGYIyPnJNB4thBOezsm6kNzly0oE3+xHV8R7nTn5PGE4ptSs+wgi0C2LKIKEQxza3iUyEooplqNYGhd61G1W87X7+vbpysqhwHi+DRHLU5pImQuc5zUXOvLwtqnG59Pjr2LfzmYfFwblT9bkHRL3Hib2lxQIjMtZwyAQQFSfSGsFjqvxoW5RuOaGa75/PGgQLIQzW9jD0cd0UGmfqQWmgDRh8ifbqspv2V/tX5KO6azQcg+0fVa5wc7T0ujF+Fu/Jm6ZG5Hvp0v68l0/qT3sNoMREz+LF8MKJ5+ajrDRK1z04Atl2DdzVhQOYD6ZhyDVH3tZOloORLJePrvpyhpJbUTd11bm9iWzcVeDxxsf9Yt6D+rJoVlwhwzWXf1gsi7MVUVHl/SUqXmDvXdtyMs96ygliFYtNBokimVYMTJpspNzjZ3v4YPQfdeq3W5bARtrp3oefnXdrKAbuYZUlnBNKMhFLyanOuPlJudfPNdg/B935dKw7dAxjP/wX/bYGZGAgSzTLVGJtzmjMmGSc5A/4wn3pu5Y1D4+wv5js+Lv2sXwZHJ5+nzf3T8spyOZ71p9E3RtX37aJfxuXAtmJ5sJylRFlmMk5y2O9meyXIA16Xu1k1WVjrfijqaf9gOU+wGtedWoYBSxiv97/mYBnRR9eZQp3kaDpTDZFu353UFSIMx1Gh2DdnTMZbnpnvpXG42I86Q0eFhhUSNyJLDs/isRJfujr06LP785QaZmKUVloaJZKl1kVTQE3Vf5iDFUICnGehZkLaL8m++rV9tP51xpA7d0JvTF3OGufKG/z3bfyx3z+zs4Wgfvh1zBSMs5oAjRhaZYoLkiWwCOX+787rA3wY/jQx2xVTqghxBCeEyUV8Yt5t5qsm8v65tZGNmanepoQhycbFluhaUoEKAFCa5Lkloodg/27dtE7B3p7ATm3DIjRnAkCKRXG2DjeIchfFq2uu8o9edQvBbIEXgjKDIu1TWNpeSrjNN0h4FFgi6cP+0UYAXSWEEqtzixuXmws0tRmdCdAx0vTaTdY9bKDP7HVgtYtAxgcr96CTzMZdwwvJElmlimaKc6YsCBiZfjDrYy9rnU1toSDFsZTWBae2yL5VLhJCKcZHIPrmqqPZkvvCW8kzQGMTYAJlee48QZsSH7ttzdXqsdw5pb31a8d99123EKTnEsaZ4RhWxIrlaZ6V2r0qlYNbN0M3AQG4WjsUhHAmhaqwPbWP9GcapEJhX8U1yYldvMG7KHq4bcBuHcZlJ2rR1AiFCeXnvrvmNcgUhnjLEmISTiRGSRpRneDM6EqrEDc4ktBEGZN7D95giaCEqKT/3Uu9cMiDmfJp/XpU+9ZrgUSupM4VdhCKpNRm8k8l/HyQ/ft5bX390XnHHpzLZfc5oSnljIQIjMqsZKk9zRplMLiqTIhmAQVa1wY9zWJvVgqDMG4qYxjLEq5ergytHmNXfqE9jT5thbG8kSEcsK5yBnwPDOgGdd8Yx7biZzBegL7HN507Fl3rp1JDW9kBTecfWLaZGXC8Rf02b3x+LD/z5OonwR9KVQJGwb4Or46Lsaf/wCmtzW5GiMAAA==&quot;"/>
     <we:property name="isFiltersActionButtonVisible" value="true"/>
     <we:property name="isVisualContainerHeaderHidden" value="false"/>
-    <we:property name="pageDisplayName" value="&quot;Sales Performance Analysis&quot;"/>
-    <we:property name="pageName" value="&quot;35e13e00f8f1a19b3b56&quot;"/>
+    <we:property name="pageDisplayName" value="&quot;Profit Analysis&quot;"/>
+    <we:property name="pageName" value="&quot;32d29d5b345693c73710&quot;"/>
     <we:property name="reportEmbeddedTime" value="&quot;2024-08-07T09:51:26.728Z&quot;"/>
     <we:property name="reportName" value="&quot;Festman Sales Analysis&quot;"/>
     <we:property name="reportState" value="&quot;CONNECTED&quot;"/>
-    <we:property name="reportUrl" value="&quot;/groups/me/reports/feb4ba7a-166b-4a53-8de7-71c8bc30d008/35e13e00f8f1a19b3b56?bookmarkGuid=58dbca87-57a7-4d1c-8cb4-bba15a5c0be4&amp;bookmarkUsage=1&amp;ctid=66b3f0c2-8bc6-451e-9603-986f618ae682&amp;fromEntryPoint=export&amp;pbi_source=storytelling_addin&quot;"/>
+    <we:property name="reportUrl" value="&quot;/groups/me/reports/feb4ba7a-166b-4a53-8de7-71c8bc30d008/32d29d5b345693c73710?bookmarkGuid=58dbca87-57a7-4d1c-8cb4-bba15a5c0be4&amp;bookmarkUsage=1&amp;ctid=66b3f0c2-8bc6-451e-9603-986f618ae682&amp;fromEntryPoint=export&amp;pbi_source=storytelling_addin&quot;"/>
   </we:properties>
   <we:bindings/>
   <we:snapshot xmlns:r="http://schemas.openxmlformats.org/officeDocument/2006/relationships" r:embed="rId1"/>

</xml_diff>